<commit_message>
ajout de la partie shs
</commit_message>
<xml_diff>
--- a/Notre rapport/diapo code-barres.pptx
+++ b/Notre rapport/diapo code-barres.pptx
@@ -4,6 +4,9 @@
   <p:sldMasterIdLst>
     <p:sldMasterId id="2147483648" r:id="rId1"/>
   </p:sldMasterIdLst>
+  <p:notesMasterIdLst>
+    <p:notesMasterId r:id="rId14"/>
+  </p:notesMasterIdLst>
   <p:sldIdLst>
     <p:sldId id="256" r:id="rId2"/>
     <p:sldId id="257" r:id="rId3"/>
@@ -15,6 +18,8 @@
     <p:sldId id="264" r:id="rId9"/>
     <p:sldId id="265" r:id="rId10"/>
     <p:sldId id="266" r:id="rId11"/>
+    <p:sldId id="267" r:id="rId12"/>
+    <p:sldId id="268" r:id="rId13"/>
   </p:sldIdLst>
   <p:sldSz cx="12192000" cy="6858000"/>
   <p:notesSz cx="6858000" cy="9144000"/>
@@ -119,6 +124,487 @@
     </p:ext>
   </p:extLst>
 </p:presentation>
+</file>
+
+<file path=ppt/notesMasters/notesMaster1.xml><?xml version="1.0" encoding="utf-8"?>
+<p:notesMaster xmlns:a="http://schemas.openxmlformats.org/drawingml/2006/main" xmlns:r="http://schemas.openxmlformats.org/officeDocument/2006/relationships" xmlns:p="http://schemas.openxmlformats.org/presentationml/2006/main">
+  <p:cSld>
+    <p:bg>
+      <p:bgRef idx="1001">
+        <a:schemeClr val="bg1"/>
+      </p:bgRef>
+    </p:bg>
+    <p:spTree>
+      <p:nvGrpSpPr>
+        <p:cNvPr id="1" name=""/>
+        <p:cNvGrpSpPr/>
+        <p:nvPr/>
+      </p:nvGrpSpPr>
+      <p:grpSpPr>
+        <a:xfrm>
+          <a:off x="0" y="0"/>
+          <a:ext cx="0" cy="0"/>
+          <a:chOff x="0" y="0"/>
+          <a:chExt cx="0" cy="0"/>
+        </a:xfrm>
+      </p:grpSpPr>
+      <p:sp>
+        <p:nvSpPr>
+          <p:cNvPr id="2" name="Espace réservé de l'en-tête 1"/>
+          <p:cNvSpPr>
+            <a:spLocks noGrp="1"/>
+          </p:cNvSpPr>
+          <p:nvPr>
+            <p:ph type="hdr" sz="quarter"/>
+          </p:nvPr>
+        </p:nvSpPr>
+        <p:spPr>
+          <a:xfrm>
+            <a:off x="0" y="0"/>
+            <a:ext cx="2971800" cy="458788"/>
+          </a:xfrm>
+          <a:prstGeom prst="rect">
+            <a:avLst/>
+          </a:prstGeom>
+        </p:spPr>
+        <p:txBody>
+          <a:bodyPr vert="horz" lIns="91440" tIns="45720" rIns="91440" bIns="45720" rtlCol="0"/>
+          <a:lstStyle>
+            <a:lvl1pPr algn="l">
+              <a:defRPr sz="1200"/>
+            </a:lvl1pPr>
+          </a:lstStyle>
+          <a:p>
+            <a:endParaRPr lang="fr-FR"/>
+          </a:p>
+        </p:txBody>
+      </p:sp>
+      <p:sp>
+        <p:nvSpPr>
+          <p:cNvPr id="3" name="Espace réservé de la date 2"/>
+          <p:cNvSpPr>
+            <a:spLocks noGrp="1"/>
+          </p:cNvSpPr>
+          <p:nvPr>
+            <p:ph type="dt" idx="1"/>
+          </p:nvPr>
+        </p:nvSpPr>
+        <p:spPr>
+          <a:xfrm>
+            <a:off x="3884613" y="0"/>
+            <a:ext cx="2971800" cy="458788"/>
+          </a:xfrm>
+          <a:prstGeom prst="rect">
+            <a:avLst/>
+          </a:prstGeom>
+        </p:spPr>
+        <p:txBody>
+          <a:bodyPr vert="horz" lIns="91440" tIns="45720" rIns="91440" bIns="45720" rtlCol="0"/>
+          <a:lstStyle>
+            <a:lvl1pPr algn="r">
+              <a:defRPr sz="1200"/>
+            </a:lvl1pPr>
+          </a:lstStyle>
+          <a:p>
+            <a:fld id="{853D5F41-DAC3-4B48-8A81-630BCD9D8F85}" type="datetimeFigureOut">
+              <a:rPr lang="fr-FR" smtClean="0"/>
+              <a:t>05/06/2020</a:t>
+            </a:fld>
+            <a:endParaRPr lang="fr-FR"/>
+          </a:p>
+        </p:txBody>
+      </p:sp>
+      <p:sp>
+        <p:nvSpPr>
+          <p:cNvPr id="4" name="Espace réservé de l'image des diapositives 3"/>
+          <p:cNvSpPr>
+            <a:spLocks noGrp="1" noRot="1" noChangeAspect="1"/>
+          </p:cNvSpPr>
+          <p:nvPr>
+            <p:ph type="sldImg" idx="2"/>
+          </p:nvPr>
+        </p:nvSpPr>
+        <p:spPr>
+          <a:xfrm>
+            <a:off x="685800" y="1143000"/>
+            <a:ext cx="5486400" cy="3086100"/>
+          </a:xfrm>
+          <a:prstGeom prst="rect">
+            <a:avLst/>
+          </a:prstGeom>
+          <a:noFill/>
+          <a:ln w="12700">
+            <a:solidFill>
+              <a:prstClr val="black"/>
+            </a:solidFill>
+          </a:ln>
+        </p:spPr>
+        <p:txBody>
+          <a:bodyPr vert="horz" lIns="91440" tIns="45720" rIns="91440" bIns="45720" rtlCol="0" anchor="ctr"/>
+          <a:lstStyle/>
+          <a:p>
+            <a:endParaRPr lang="fr-FR"/>
+          </a:p>
+        </p:txBody>
+      </p:sp>
+      <p:sp>
+        <p:nvSpPr>
+          <p:cNvPr id="5" name="Espace réservé des notes 4"/>
+          <p:cNvSpPr>
+            <a:spLocks noGrp="1"/>
+          </p:cNvSpPr>
+          <p:nvPr>
+            <p:ph type="body" sz="quarter" idx="3"/>
+          </p:nvPr>
+        </p:nvSpPr>
+        <p:spPr>
+          <a:xfrm>
+            <a:off x="685800" y="4400550"/>
+            <a:ext cx="5486400" cy="3600450"/>
+          </a:xfrm>
+          <a:prstGeom prst="rect">
+            <a:avLst/>
+          </a:prstGeom>
+        </p:spPr>
+        <p:txBody>
+          <a:bodyPr vert="horz" lIns="91440" tIns="45720" rIns="91440" bIns="45720" rtlCol="0"/>
+          <a:lstStyle/>
+          <a:p>
+            <a:pPr lvl="0"/>
+            <a:r>
+              <a:rPr lang="fr-FR"/>
+              <a:t>Cliquez pour modifier les styles du texte du masque</a:t>
+            </a:r>
+          </a:p>
+          <a:p>
+            <a:pPr lvl="1"/>
+            <a:r>
+              <a:rPr lang="fr-FR"/>
+              <a:t>Deuxième niveau</a:t>
+            </a:r>
+          </a:p>
+          <a:p>
+            <a:pPr lvl="2"/>
+            <a:r>
+              <a:rPr lang="fr-FR"/>
+              <a:t>Troisième niveau</a:t>
+            </a:r>
+          </a:p>
+          <a:p>
+            <a:pPr lvl="3"/>
+            <a:r>
+              <a:rPr lang="fr-FR"/>
+              <a:t>Quatrième niveau</a:t>
+            </a:r>
+          </a:p>
+          <a:p>
+            <a:pPr lvl="4"/>
+            <a:r>
+              <a:rPr lang="fr-FR"/>
+              <a:t>Cinquième niveau</a:t>
+            </a:r>
+          </a:p>
+        </p:txBody>
+      </p:sp>
+      <p:sp>
+        <p:nvSpPr>
+          <p:cNvPr id="6" name="Espace réservé du pied de page 5"/>
+          <p:cNvSpPr>
+            <a:spLocks noGrp="1"/>
+          </p:cNvSpPr>
+          <p:nvPr>
+            <p:ph type="ftr" sz="quarter" idx="4"/>
+          </p:nvPr>
+        </p:nvSpPr>
+        <p:spPr>
+          <a:xfrm>
+            <a:off x="0" y="8685213"/>
+            <a:ext cx="2971800" cy="458787"/>
+          </a:xfrm>
+          <a:prstGeom prst="rect">
+            <a:avLst/>
+          </a:prstGeom>
+        </p:spPr>
+        <p:txBody>
+          <a:bodyPr vert="horz" lIns="91440" tIns="45720" rIns="91440" bIns="45720" rtlCol="0" anchor="b"/>
+          <a:lstStyle>
+            <a:lvl1pPr algn="l">
+              <a:defRPr sz="1200"/>
+            </a:lvl1pPr>
+          </a:lstStyle>
+          <a:p>
+            <a:endParaRPr lang="fr-FR"/>
+          </a:p>
+        </p:txBody>
+      </p:sp>
+      <p:sp>
+        <p:nvSpPr>
+          <p:cNvPr id="7" name="Espace réservé du numéro de diapositive 6"/>
+          <p:cNvSpPr>
+            <a:spLocks noGrp="1"/>
+          </p:cNvSpPr>
+          <p:nvPr>
+            <p:ph type="sldNum" sz="quarter" idx="5"/>
+          </p:nvPr>
+        </p:nvSpPr>
+        <p:spPr>
+          <a:xfrm>
+            <a:off x="3884613" y="8685213"/>
+            <a:ext cx="2971800" cy="458787"/>
+          </a:xfrm>
+          <a:prstGeom prst="rect">
+            <a:avLst/>
+          </a:prstGeom>
+        </p:spPr>
+        <p:txBody>
+          <a:bodyPr vert="horz" lIns="91440" tIns="45720" rIns="91440" bIns="45720" rtlCol="0" anchor="b"/>
+          <a:lstStyle>
+            <a:lvl1pPr algn="r">
+              <a:defRPr sz="1200"/>
+            </a:lvl1pPr>
+          </a:lstStyle>
+          <a:p>
+            <a:fld id="{1B6A5C66-1D58-4497-AD22-BA4FD973C4C9}" type="slidenum">
+              <a:rPr lang="fr-FR" smtClean="0"/>
+              <a:t>‹N°›</a:t>
+            </a:fld>
+            <a:endParaRPr lang="fr-FR"/>
+          </a:p>
+        </p:txBody>
+      </p:sp>
+    </p:spTree>
+    <p:extLst>
+      <p:ext uri="{BB962C8B-B14F-4D97-AF65-F5344CB8AC3E}">
+        <p14:creationId xmlns:p14="http://schemas.microsoft.com/office/powerpoint/2010/main" val="1367189232"/>
+      </p:ext>
+    </p:extLst>
+  </p:cSld>
+  <p:clrMap bg1="lt1" tx1="dk1" bg2="lt2" tx2="dk2" accent1="accent1" accent2="accent2" accent3="accent3" accent4="accent4" accent5="accent5" accent6="accent6" hlink="hlink" folHlink="folHlink"/>
+  <p:notesStyle>
+    <a:lvl1pPr marL="0" algn="l" defTabSz="914400" rtl="0" eaLnBrk="1" latinLnBrk="0" hangingPunct="1">
+      <a:defRPr sz="1200" kern="1200">
+        <a:solidFill>
+          <a:schemeClr val="tx1"/>
+        </a:solidFill>
+        <a:latin typeface="+mn-lt"/>
+        <a:ea typeface="+mn-ea"/>
+        <a:cs typeface="+mn-cs"/>
+      </a:defRPr>
+    </a:lvl1pPr>
+    <a:lvl2pPr marL="457200" algn="l" defTabSz="914400" rtl="0" eaLnBrk="1" latinLnBrk="0" hangingPunct="1">
+      <a:defRPr sz="1200" kern="1200">
+        <a:solidFill>
+          <a:schemeClr val="tx1"/>
+        </a:solidFill>
+        <a:latin typeface="+mn-lt"/>
+        <a:ea typeface="+mn-ea"/>
+        <a:cs typeface="+mn-cs"/>
+      </a:defRPr>
+    </a:lvl2pPr>
+    <a:lvl3pPr marL="914400" algn="l" defTabSz="914400" rtl="0" eaLnBrk="1" latinLnBrk="0" hangingPunct="1">
+      <a:defRPr sz="1200" kern="1200">
+        <a:solidFill>
+          <a:schemeClr val="tx1"/>
+        </a:solidFill>
+        <a:latin typeface="+mn-lt"/>
+        <a:ea typeface="+mn-ea"/>
+        <a:cs typeface="+mn-cs"/>
+      </a:defRPr>
+    </a:lvl3pPr>
+    <a:lvl4pPr marL="1371600" algn="l" defTabSz="914400" rtl="0" eaLnBrk="1" latinLnBrk="0" hangingPunct="1">
+      <a:defRPr sz="1200" kern="1200">
+        <a:solidFill>
+          <a:schemeClr val="tx1"/>
+        </a:solidFill>
+        <a:latin typeface="+mn-lt"/>
+        <a:ea typeface="+mn-ea"/>
+        <a:cs typeface="+mn-cs"/>
+      </a:defRPr>
+    </a:lvl4pPr>
+    <a:lvl5pPr marL="1828800" algn="l" defTabSz="914400" rtl="0" eaLnBrk="1" latinLnBrk="0" hangingPunct="1">
+      <a:defRPr sz="1200" kern="1200">
+        <a:solidFill>
+          <a:schemeClr val="tx1"/>
+        </a:solidFill>
+        <a:latin typeface="+mn-lt"/>
+        <a:ea typeface="+mn-ea"/>
+        <a:cs typeface="+mn-cs"/>
+      </a:defRPr>
+    </a:lvl5pPr>
+    <a:lvl6pPr marL="2286000" algn="l" defTabSz="914400" rtl="0" eaLnBrk="1" latinLnBrk="0" hangingPunct="1">
+      <a:defRPr sz="1200" kern="1200">
+        <a:solidFill>
+          <a:schemeClr val="tx1"/>
+        </a:solidFill>
+        <a:latin typeface="+mn-lt"/>
+        <a:ea typeface="+mn-ea"/>
+        <a:cs typeface="+mn-cs"/>
+      </a:defRPr>
+    </a:lvl6pPr>
+    <a:lvl7pPr marL="2743200" algn="l" defTabSz="914400" rtl="0" eaLnBrk="1" latinLnBrk="0" hangingPunct="1">
+      <a:defRPr sz="1200" kern="1200">
+        <a:solidFill>
+          <a:schemeClr val="tx1"/>
+        </a:solidFill>
+        <a:latin typeface="+mn-lt"/>
+        <a:ea typeface="+mn-ea"/>
+        <a:cs typeface="+mn-cs"/>
+      </a:defRPr>
+    </a:lvl7pPr>
+    <a:lvl8pPr marL="3200400" algn="l" defTabSz="914400" rtl="0" eaLnBrk="1" latinLnBrk="0" hangingPunct="1">
+      <a:defRPr sz="1200" kern="1200">
+        <a:solidFill>
+          <a:schemeClr val="tx1"/>
+        </a:solidFill>
+        <a:latin typeface="+mn-lt"/>
+        <a:ea typeface="+mn-ea"/>
+        <a:cs typeface="+mn-cs"/>
+      </a:defRPr>
+    </a:lvl8pPr>
+    <a:lvl9pPr marL="3657600" algn="l" defTabSz="914400" rtl="0" eaLnBrk="1" latinLnBrk="0" hangingPunct="1">
+      <a:defRPr sz="1200" kern="1200">
+        <a:solidFill>
+          <a:schemeClr val="tx1"/>
+        </a:solidFill>
+        <a:latin typeface="+mn-lt"/>
+        <a:ea typeface="+mn-ea"/>
+        <a:cs typeface="+mn-cs"/>
+      </a:defRPr>
+    </a:lvl9pPr>
+  </p:notesStyle>
+</p:notesMaster>
+</file>
+
+<file path=ppt/notesSlides/notesSlide1.xml><?xml version="1.0" encoding="utf-8"?>
+<p:notes xmlns:a="http://schemas.openxmlformats.org/drawingml/2006/main" xmlns:r="http://schemas.openxmlformats.org/officeDocument/2006/relationships" xmlns:p="http://schemas.openxmlformats.org/presentationml/2006/main">
+  <p:cSld>
+    <p:spTree>
+      <p:nvGrpSpPr>
+        <p:cNvPr id="1" name=""/>
+        <p:cNvGrpSpPr/>
+        <p:nvPr/>
+      </p:nvGrpSpPr>
+      <p:grpSpPr>
+        <a:xfrm>
+          <a:off x="0" y="0"/>
+          <a:ext cx="0" cy="0"/>
+          <a:chOff x="0" y="0"/>
+          <a:chExt cx="0" cy="0"/>
+        </a:xfrm>
+      </p:grpSpPr>
+      <p:sp>
+        <p:nvSpPr>
+          <p:cNvPr id="2" name="Espace réservé de l'image des diapositives 1"/>
+          <p:cNvSpPr>
+            <a:spLocks noGrp="1" noRot="1" noChangeAspect="1"/>
+          </p:cNvSpPr>
+          <p:nvPr>
+            <p:ph type="sldImg"/>
+          </p:nvPr>
+        </p:nvSpPr>
+        <p:spPr/>
+      </p:sp>
+      <p:sp>
+        <p:nvSpPr>
+          <p:cNvPr id="3" name="Espace réservé des notes 2"/>
+          <p:cNvSpPr>
+            <a:spLocks noGrp="1"/>
+          </p:cNvSpPr>
+          <p:nvPr>
+            <p:ph type="body" idx="1"/>
+          </p:nvPr>
+        </p:nvSpPr>
+        <p:spPr/>
+        <p:txBody>
+          <a:bodyPr/>
+          <a:lstStyle/>
+          <a:p>
+            <a:pPr rtl="0"/>
+            <a:r>
+              <a:rPr lang="fr-FR" sz="1200" b="0" i="0" u="none" strike="noStrike" kern="1200" dirty="0">
+                <a:solidFill>
+                  <a:schemeClr val="tx1"/>
+                </a:solidFill>
+                <a:effectLst/>
+                <a:latin typeface="+mn-lt"/>
+                <a:ea typeface="+mn-ea"/>
+                <a:cs typeface="+mn-cs"/>
+              </a:rPr>
+              <a:t>santé : lien de confiance car transparence + service qui aiguille le consommateur dans ses achats = les utilisateurs sont à fortiori dépendant de l’application pour faire leurs achats alors que l’application ne peut remplacer un nutritionniste + ils risque d’être à la merci des bonnes ou mauvaises intentions de la société </a:t>
+            </a:r>
+            <a:endParaRPr lang="fr-FR" dirty="0">
+              <a:effectLst/>
+            </a:endParaRPr>
+          </a:p>
+          <a:p>
+            <a:pPr rtl="0"/>
+            <a:endParaRPr lang="fr-FR" sz="1200" b="0" i="0" u="none" strike="noStrike" kern="1200" dirty="0">
+              <a:solidFill>
+                <a:schemeClr val="tx1"/>
+              </a:solidFill>
+              <a:effectLst/>
+              <a:latin typeface="+mn-lt"/>
+              <a:ea typeface="+mn-ea"/>
+              <a:cs typeface="+mn-cs"/>
+            </a:endParaRPr>
+          </a:p>
+          <a:p>
+            <a:pPr rtl="0"/>
+            <a:r>
+              <a:rPr lang="fr-FR" sz="1200" b="0" i="0" u="none" strike="noStrike" kern="1200" dirty="0">
+                <a:solidFill>
+                  <a:schemeClr val="tx1"/>
+                </a:solidFill>
+                <a:effectLst/>
+                <a:latin typeface="+mn-lt"/>
+                <a:ea typeface="+mn-ea"/>
+                <a:cs typeface="+mn-cs"/>
+              </a:rPr>
+              <a:t>Vente de données : L’utilisation massive de l’application permet de dresser le profil socioéconomique de chaque utilisateur, risque de vente de ses données aux fabricants ou autres entreprises</a:t>
+            </a:r>
+            <a:endParaRPr lang="fr-FR" dirty="0">
+              <a:effectLst/>
+            </a:endParaRPr>
+          </a:p>
+          <a:p>
+            <a:endParaRPr lang="fr-FR" dirty="0"/>
+          </a:p>
+        </p:txBody>
+      </p:sp>
+      <p:sp>
+        <p:nvSpPr>
+          <p:cNvPr id="4" name="Espace réservé du numéro de diapositive 3"/>
+          <p:cNvSpPr>
+            <a:spLocks noGrp="1"/>
+          </p:cNvSpPr>
+          <p:nvPr>
+            <p:ph type="sldNum" sz="quarter" idx="5"/>
+          </p:nvPr>
+        </p:nvSpPr>
+        <p:spPr/>
+        <p:txBody>
+          <a:bodyPr/>
+          <a:lstStyle/>
+          <a:p>
+            <a:fld id="{1B6A5C66-1D58-4497-AD22-BA4FD973C4C9}" type="slidenum">
+              <a:rPr lang="fr-FR" smtClean="0"/>
+              <a:t>12</a:t>
+            </a:fld>
+            <a:endParaRPr lang="fr-FR"/>
+          </a:p>
+        </p:txBody>
+      </p:sp>
+    </p:spTree>
+    <p:extLst>
+      <p:ext uri="{BB962C8B-B14F-4D97-AF65-F5344CB8AC3E}">
+        <p14:creationId xmlns:p14="http://schemas.microsoft.com/office/powerpoint/2010/main" val="667284667"/>
+      </p:ext>
+    </p:extLst>
+  </p:cSld>
+  <p:clrMapOvr>
+    <a:masterClrMapping/>
+  </p:clrMapOvr>
+</p:notes>
 </file>
 
 <file path=ppt/slideLayouts/slideLayout1.xml><?xml version="1.0" encoding="utf-8"?>
@@ -3975,6 +4461,1177 @@
     <p:extLst>
       <p:ext uri="{BB962C8B-B14F-4D97-AF65-F5344CB8AC3E}">
         <p14:creationId xmlns:p14="http://schemas.microsoft.com/office/powerpoint/2010/main" val="2758919398"/>
+      </p:ext>
+    </p:extLst>
+  </p:cSld>
+  <p:clrMapOvr>
+    <a:masterClrMapping/>
+  </p:clrMapOvr>
+</p:sld>
+</file>
+
+<file path=ppt/slides/slide11.xml><?xml version="1.0" encoding="utf-8"?>
+<p:sld xmlns:a="http://schemas.openxmlformats.org/drawingml/2006/main" xmlns:r="http://schemas.openxmlformats.org/officeDocument/2006/relationships" xmlns:p="http://schemas.openxmlformats.org/presentationml/2006/main">
+  <p:cSld>
+    <p:spTree>
+      <p:nvGrpSpPr>
+        <p:cNvPr id="1" name=""/>
+        <p:cNvGrpSpPr/>
+        <p:nvPr/>
+      </p:nvGrpSpPr>
+      <p:grpSpPr>
+        <a:xfrm>
+          <a:off x="0" y="0"/>
+          <a:ext cx="0" cy="0"/>
+          <a:chOff x="0" y="0"/>
+          <a:chExt cx="0" cy="0"/>
+        </a:xfrm>
+      </p:grpSpPr>
+      <p:sp>
+        <p:nvSpPr>
+          <p:cNvPr id="2" name="Titre 1">
+            <a:extLst>
+              <a:ext uri="{FF2B5EF4-FFF2-40B4-BE49-F238E27FC236}">
+                <a16:creationId xmlns:a16="http://schemas.microsoft.com/office/drawing/2014/main" id="{13A4A248-E73E-41F4-81A1-F22994AA22CD}"/>
+              </a:ext>
+            </a:extLst>
+          </p:cNvPr>
+          <p:cNvSpPr>
+            <a:spLocks noGrp="1"/>
+          </p:cNvSpPr>
+          <p:nvPr>
+            <p:ph type="title"/>
+          </p:nvPr>
+        </p:nvSpPr>
+        <p:spPr/>
+        <p:txBody>
+          <a:bodyPr/>
+          <a:lstStyle/>
+          <a:p>
+            <a:pPr algn="ctr"/>
+            <a:r>
+              <a:rPr lang="fr-FR" dirty="0"/>
+              <a:t>Quelles dérives à anticiper ? </a:t>
+            </a:r>
+          </a:p>
+        </p:txBody>
+      </p:sp>
+      <p:sp>
+        <p:nvSpPr>
+          <p:cNvPr id="4" name="Rectangle : coins arrondis 3">
+            <a:extLst>
+              <a:ext uri="{FF2B5EF4-FFF2-40B4-BE49-F238E27FC236}">
+                <a16:creationId xmlns:a16="http://schemas.microsoft.com/office/drawing/2014/main" id="{BFA94AA4-297F-4C76-AE5B-8907ECCB5EAE}"/>
+              </a:ext>
+            </a:extLst>
+          </p:cNvPr>
+          <p:cNvSpPr/>
+          <p:nvPr/>
+        </p:nvSpPr>
+        <p:spPr>
+          <a:xfrm>
+            <a:off x="1151732" y="2667567"/>
+            <a:ext cx="2849336" cy="392238"/>
+          </a:xfrm>
+          <a:prstGeom prst="roundRect">
+            <a:avLst/>
+          </a:prstGeom>
+          <a:ln>
+            <a:solidFill>
+              <a:schemeClr val="tx1"/>
+            </a:solidFill>
+          </a:ln>
+        </p:spPr>
+        <p:style>
+          <a:lnRef idx="2">
+            <a:schemeClr val="accent1">
+              <a:shade val="50000"/>
+            </a:schemeClr>
+          </a:lnRef>
+          <a:fillRef idx="1">
+            <a:schemeClr val="accent1"/>
+          </a:fillRef>
+          <a:effectRef idx="0">
+            <a:schemeClr val="accent1"/>
+          </a:effectRef>
+          <a:fontRef idx="minor">
+            <a:schemeClr val="lt1"/>
+          </a:fontRef>
+        </p:style>
+        <p:txBody>
+          <a:bodyPr rtlCol="0" anchor="ctr"/>
+          <a:lstStyle/>
+          <a:p>
+            <a:pPr algn="ctr"/>
+            <a:endParaRPr lang="fr-FR" dirty="0"/>
+          </a:p>
+        </p:txBody>
+      </p:sp>
+      <p:sp>
+        <p:nvSpPr>
+          <p:cNvPr id="5" name="ZoneTexte 4">
+            <a:extLst>
+              <a:ext uri="{FF2B5EF4-FFF2-40B4-BE49-F238E27FC236}">
+                <a16:creationId xmlns:a16="http://schemas.microsoft.com/office/drawing/2014/main" id="{7122E485-A849-46B0-9BC5-12D36BEA721A}"/>
+              </a:ext>
+            </a:extLst>
+          </p:cNvPr>
+          <p:cNvSpPr txBox="1"/>
+          <p:nvPr/>
+        </p:nvSpPr>
+        <p:spPr>
+          <a:xfrm>
+            <a:off x="1138125" y="2667567"/>
+            <a:ext cx="2876550" cy="369332"/>
+          </a:xfrm>
+          <a:prstGeom prst="rect">
+            <a:avLst/>
+          </a:prstGeom>
+          <a:noFill/>
+        </p:spPr>
+        <p:txBody>
+          <a:bodyPr wrap="square" rtlCol="0">
+            <a:spAutoFit/>
+          </a:bodyPr>
+          <a:lstStyle/>
+          <a:p>
+            <a:pPr algn="ctr"/>
+            <a:r>
+              <a:rPr lang="fr-FR" dirty="0"/>
+              <a:t>Application très bon marché </a:t>
+            </a:r>
+          </a:p>
+        </p:txBody>
+      </p:sp>
+      <p:sp>
+        <p:nvSpPr>
+          <p:cNvPr id="8" name="Rectangle : coins arrondis 7">
+            <a:extLst>
+              <a:ext uri="{FF2B5EF4-FFF2-40B4-BE49-F238E27FC236}">
+                <a16:creationId xmlns:a16="http://schemas.microsoft.com/office/drawing/2014/main" id="{CC2F5464-7592-4267-BBF4-FC1CC65CB51B}"/>
+              </a:ext>
+            </a:extLst>
+          </p:cNvPr>
+          <p:cNvSpPr/>
+          <p:nvPr/>
+        </p:nvSpPr>
+        <p:spPr>
+          <a:xfrm>
+            <a:off x="1138125" y="3473791"/>
+            <a:ext cx="2849336" cy="392238"/>
+          </a:xfrm>
+          <a:prstGeom prst="roundRect">
+            <a:avLst/>
+          </a:prstGeom>
+          <a:ln>
+            <a:solidFill>
+              <a:schemeClr val="tx1"/>
+            </a:solidFill>
+          </a:ln>
+        </p:spPr>
+        <p:style>
+          <a:lnRef idx="2">
+            <a:schemeClr val="accent1">
+              <a:shade val="50000"/>
+            </a:schemeClr>
+          </a:lnRef>
+          <a:fillRef idx="1">
+            <a:schemeClr val="accent1"/>
+          </a:fillRef>
+          <a:effectRef idx="0">
+            <a:schemeClr val="accent1"/>
+          </a:effectRef>
+          <a:fontRef idx="minor">
+            <a:schemeClr val="lt1"/>
+          </a:fontRef>
+        </p:style>
+        <p:txBody>
+          <a:bodyPr rtlCol="0" anchor="ctr"/>
+          <a:lstStyle/>
+          <a:p>
+            <a:pPr algn="ctr"/>
+            <a:endParaRPr lang="fr-FR" dirty="0"/>
+          </a:p>
+        </p:txBody>
+      </p:sp>
+      <p:sp>
+        <p:nvSpPr>
+          <p:cNvPr id="9" name="Rectangle : coins arrondis 8">
+            <a:extLst>
+              <a:ext uri="{FF2B5EF4-FFF2-40B4-BE49-F238E27FC236}">
+                <a16:creationId xmlns:a16="http://schemas.microsoft.com/office/drawing/2014/main" id="{FB015EE0-E2BA-4F70-8D28-14C8A60260CA}"/>
+              </a:ext>
+            </a:extLst>
+          </p:cNvPr>
+          <p:cNvSpPr/>
+          <p:nvPr/>
+        </p:nvSpPr>
+        <p:spPr>
+          <a:xfrm>
+            <a:off x="1138124" y="4269141"/>
+            <a:ext cx="2849336" cy="392238"/>
+          </a:xfrm>
+          <a:prstGeom prst="roundRect">
+            <a:avLst/>
+          </a:prstGeom>
+          <a:ln>
+            <a:solidFill>
+              <a:schemeClr val="tx1"/>
+            </a:solidFill>
+          </a:ln>
+        </p:spPr>
+        <p:style>
+          <a:lnRef idx="2">
+            <a:schemeClr val="accent1">
+              <a:shade val="50000"/>
+            </a:schemeClr>
+          </a:lnRef>
+          <a:fillRef idx="1">
+            <a:schemeClr val="accent1"/>
+          </a:fillRef>
+          <a:effectRef idx="0">
+            <a:schemeClr val="accent1"/>
+          </a:effectRef>
+          <a:fontRef idx="minor">
+            <a:schemeClr val="lt1"/>
+          </a:fontRef>
+        </p:style>
+        <p:txBody>
+          <a:bodyPr rtlCol="0" anchor="ctr"/>
+          <a:lstStyle/>
+          <a:p>
+            <a:pPr algn="ctr"/>
+            <a:endParaRPr lang="fr-FR" dirty="0"/>
+          </a:p>
+        </p:txBody>
+      </p:sp>
+      <p:sp>
+        <p:nvSpPr>
+          <p:cNvPr id="10" name="ZoneTexte 9">
+            <a:extLst>
+              <a:ext uri="{FF2B5EF4-FFF2-40B4-BE49-F238E27FC236}">
+                <a16:creationId xmlns:a16="http://schemas.microsoft.com/office/drawing/2014/main" id="{54FFAB79-D4BE-49CB-82FB-D01C3913B45C}"/>
+              </a:ext>
+            </a:extLst>
+          </p:cNvPr>
+          <p:cNvSpPr txBox="1"/>
+          <p:nvPr/>
+        </p:nvSpPr>
+        <p:spPr>
+          <a:xfrm>
+            <a:off x="1248342" y="3485244"/>
+            <a:ext cx="2656114" cy="369332"/>
+          </a:xfrm>
+          <a:prstGeom prst="rect">
+            <a:avLst/>
+          </a:prstGeom>
+          <a:noFill/>
+        </p:spPr>
+        <p:txBody>
+          <a:bodyPr wrap="square" rtlCol="0">
+            <a:spAutoFit/>
+          </a:bodyPr>
+          <a:lstStyle/>
+          <a:p>
+            <a:pPr algn="ctr"/>
+            <a:r>
+              <a:rPr lang="fr-FR" dirty="0"/>
+              <a:t>Diffusion limitée </a:t>
+            </a:r>
+          </a:p>
+        </p:txBody>
+      </p:sp>
+      <p:sp>
+        <p:nvSpPr>
+          <p:cNvPr id="11" name="ZoneTexte 10">
+            <a:extLst>
+              <a:ext uri="{FF2B5EF4-FFF2-40B4-BE49-F238E27FC236}">
+                <a16:creationId xmlns:a16="http://schemas.microsoft.com/office/drawing/2014/main" id="{125F7A6C-FBDA-47AD-9B09-A7EB61E2C811}"/>
+              </a:ext>
+            </a:extLst>
+          </p:cNvPr>
+          <p:cNvSpPr txBox="1"/>
+          <p:nvPr/>
+        </p:nvSpPr>
+        <p:spPr>
+          <a:xfrm>
+            <a:off x="1234735" y="4260505"/>
+            <a:ext cx="2656114" cy="369332"/>
+          </a:xfrm>
+          <a:prstGeom prst="rect">
+            <a:avLst/>
+          </a:prstGeom>
+          <a:noFill/>
+        </p:spPr>
+        <p:txBody>
+          <a:bodyPr wrap="square" rtlCol="0">
+            <a:spAutoFit/>
+          </a:bodyPr>
+          <a:lstStyle/>
+          <a:p>
+            <a:pPr algn="ctr"/>
+            <a:r>
+              <a:rPr lang="fr-FR" dirty="0"/>
+              <a:t>Dérives possibles limités</a:t>
+            </a:r>
+          </a:p>
+        </p:txBody>
+      </p:sp>
+      <p:sp>
+        <p:nvSpPr>
+          <p:cNvPr id="12" name="Flèche : bas 11">
+            <a:extLst>
+              <a:ext uri="{FF2B5EF4-FFF2-40B4-BE49-F238E27FC236}">
+                <a16:creationId xmlns:a16="http://schemas.microsoft.com/office/drawing/2014/main" id="{86B5FECC-6293-4E1B-B722-E0BBEFAC1915}"/>
+              </a:ext>
+            </a:extLst>
+          </p:cNvPr>
+          <p:cNvSpPr/>
+          <p:nvPr/>
+        </p:nvSpPr>
+        <p:spPr>
+          <a:xfrm>
+            <a:off x="2486176" y="3070679"/>
+            <a:ext cx="180447" cy="392238"/>
+          </a:xfrm>
+          <a:prstGeom prst="downArrow">
+            <a:avLst/>
+          </a:prstGeom>
+        </p:spPr>
+        <p:style>
+          <a:lnRef idx="2">
+            <a:schemeClr val="accent1">
+              <a:shade val="50000"/>
+            </a:schemeClr>
+          </a:lnRef>
+          <a:fillRef idx="1">
+            <a:schemeClr val="accent1"/>
+          </a:fillRef>
+          <a:effectRef idx="0">
+            <a:schemeClr val="accent1"/>
+          </a:effectRef>
+          <a:fontRef idx="minor">
+            <a:schemeClr val="lt1"/>
+          </a:fontRef>
+        </p:style>
+        <p:txBody>
+          <a:bodyPr rtlCol="0" anchor="ctr"/>
+          <a:lstStyle/>
+          <a:p>
+            <a:pPr algn="ctr"/>
+            <a:endParaRPr lang="fr-FR"/>
+          </a:p>
+        </p:txBody>
+      </p:sp>
+      <p:sp>
+        <p:nvSpPr>
+          <p:cNvPr id="13" name="Flèche : bas 12">
+            <a:extLst>
+              <a:ext uri="{FF2B5EF4-FFF2-40B4-BE49-F238E27FC236}">
+                <a16:creationId xmlns:a16="http://schemas.microsoft.com/office/drawing/2014/main" id="{4526131B-4C7F-46A8-9688-26F306F7E827}"/>
+              </a:ext>
+            </a:extLst>
+          </p:cNvPr>
+          <p:cNvSpPr/>
+          <p:nvPr/>
+        </p:nvSpPr>
+        <p:spPr>
+          <a:xfrm>
+            <a:off x="2472569" y="3876903"/>
+            <a:ext cx="180447" cy="392238"/>
+          </a:xfrm>
+          <a:prstGeom prst="downArrow">
+            <a:avLst/>
+          </a:prstGeom>
+        </p:spPr>
+        <p:style>
+          <a:lnRef idx="2">
+            <a:schemeClr val="accent1">
+              <a:shade val="50000"/>
+            </a:schemeClr>
+          </a:lnRef>
+          <a:fillRef idx="1">
+            <a:schemeClr val="accent1"/>
+          </a:fillRef>
+          <a:effectRef idx="0">
+            <a:schemeClr val="accent1"/>
+          </a:effectRef>
+          <a:fontRef idx="minor">
+            <a:schemeClr val="lt1"/>
+          </a:fontRef>
+        </p:style>
+        <p:txBody>
+          <a:bodyPr rtlCol="0" anchor="ctr"/>
+          <a:lstStyle/>
+          <a:p>
+            <a:pPr algn="ctr"/>
+            <a:endParaRPr lang="fr-FR"/>
+          </a:p>
+        </p:txBody>
+      </p:sp>
+      <p:sp>
+        <p:nvSpPr>
+          <p:cNvPr id="14" name="Flèche : bas 13">
+            <a:extLst>
+              <a:ext uri="{FF2B5EF4-FFF2-40B4-BE49-F238E27FC236}">
+                <a16:creationId xmlns:a16="http://schemas.microsoft.com/office/drawing/2014/main" id="{BC220B8E-3E65-4642-BA1C-93B6462687D1}"/>
+              </a:ext>
+            </a:extLst>
+          </p:cNvPr>
+          <p:cNvSpPr/>
+          <p:nvPr/>
+        </p:nvSpPr>
+        <p:spPr>
+          <a:xfrm rot="16200000">
+            <a:off x="5727168" y="980604"/>
+            <a:ext cx="202617" cy="3682033"/>
+          </a:xfrm>
+          <a:prstGeom prst="downArrow">
+            <a:avLst/>
+          </a:prstGeom>
+          <a:solidFill>
+            <a:schemeClr val="accent6"/>
+          </a:solidFill>
+        </p:spPr>
+        <p:style>
+          <a:lnRef idx="2">
+            <a:schemeClr val="accent1">
+              <a:shade val="50000"/>
+            </a:schemeClr>
+          </a:lnRef>
+          <a:fillRef idx="1">
+            <a:schemeClr val="accent1"/>
+          </a:fillRef>
+          <a:effectRef idx="0">
+            <a:schemeClr val="accent1"/>
+          </a:effectRef>
+          <a:fontRef idx="minor">
+            <a:schemeClr val="lt1"/>
+          </a:fontRef>
+        </p:style>
+        <p:txBody>
+          <a:bodyPr rtlCol="0" anchor="ctr"/>
+          <a:lstStyle/>
+          <a:p>
+            <a:pPr algn="ctr"/>
+            <a:endParaRPr lang="fr-FR"/>
+          </a:p>
+        </p:txBody>
+      </p:sp>
+      <p:sp>
+        <p:nvSpPr>
+          <p:cNvPr id="15" name="ZoneTexte 14">
+            <a:extLst>
+              <a:ext uri="{FF2B5EF4-FFF2-40B4-BE49-F238E27FC236}">
+                <a16:creationId xmlns:a16="http://schemas.microsoft.com/office/drawing/2014/main" id="{AF86C8E7-2B05-4255-ADAD-C4F07801C561}"/>
+              </a:ext>
+            </a:extLst>
+          </p:cNvPr>
+          <p:cNvSpPr txBox="1"/>
+          <p:nvPr/>
+        </p:nvSpPr>
+        <p:spPr>
+          <a:xfrm>
+            <a:off x="4158291" y="2394314"/>
+            <a:ext cx="3367585" cy="369332"/>
+          </a:xfrm>
+          <a:prstGeom prst="rect">
+            <a:avLst/>
+          </a:prstGeom>
+          <a:noFill/>
+        </p:spPr>
+        <p:txBody>
+          <a:bodyPr wrap="square" rtlCol="0">
+            <a:spAutoFit/>
+          </a:bodyPr>
+          <a:lstStyle/>
+          <a:p>
+            <a:r>
+              <a:rPr lang="fr-FR" dirty="0"/>
+              <a:t>Interface graphique fonctionnelle </a:t>
+            </a:r>
+          </a:p>
+        </p:txBody>
+      </p:sp>
+      <p:pic>
+        <p:nvPicPr>
+          <p:cNvPr id="1026" name="Picture 2">
+            <a:extLst>
+              <a:ext uri="{FF2B5EF4-FFF2-40B4-BE49-F238E27FC236}">
+                <a16:creationId xmlns:a16="http://schemas.microsoft.com/office/drawing/2014/main" id="{BEBEC446-26A4-404C-B473-C830BAE3B67A}"/>
+              </a:ext>
+            </a:extLst>
+          </p:cNvPr>
+          <p:cNvPicPr>
+            <a:picLocks noGrp="1" noChangeAspect="1" noChangeArrowheads="1"/>
+          </p:cNvPicPr>
+          <p:nvPr>
+            <p:ph idx="1"/>
+          </p:nvPr>
+        </p:nvPicPr>
+        <p:blipFill>
+          <a:blip r:embed="rId2">
+            <a:extLst>
+              <a:ext uri="{28A0092B-C50C-407E-A947-70E740481C1C}">
+                <a14:useLocalDpi xmlns:a14="http://schemas.microsoft.com/office/drawing/2010/main" val="0"/>
+              </a:ext>
+            </a:extLst>
+          </a:blip>
+          <a:srcRect/>
+          <a:stretch>
+            <a:fillRect/>
+          </a:stretch>
+        </p:blipFill>
+        <p:spPr bwMode="auto">
+          <a:xfrm>
+            <a:off x="7669492" y="2578980"/>
+            <a:ext cx="4488726" cy="2296940"/>
+          </a:xfrm>
+          <a:prstGeom prst="rect">
+            <a:avLst/>
+          </a:prstGeom>
+          <a:noFill/>
+          <a:extLst>
+            <a:ext uri="{909E8E84-426E-40DD-AFC4-6F175D3DCCD1}">
+              <a14:hiddenFill xmlns:a14="http://schemas.microsoft.com/office/drawing/2010/main">
+                <a:solidFill>
+                  <a:srgbClr val="FFFFFF"/>
+                </a:solidFill>
+              </a14:hiddenFill>
+            </a:ext>
+          </a:extLst>
+        </p:spPr>
+      </p:pic>
+      <p:sp>
+        <p:nvSpPr>
+          <p:cNvPr id="17" name="Flèche : bas 16">
+            <a:extLst>
+              <a:ext uri="{FF2B5EF4-FFF2-40B4-BE49-F238E27FC236}">
+                <a16:creationId xmlns:a16="http://schemas.microsoft.com/office/drawing/2014/main" id="{EC1D5C08-C644-4A25-A725-DC1CEDB8821C}"/>
+              </a:ext>
+            </a:extLst>
+          </p:cNvPr>
+          <p:cNvSpPr/>
+          <p:nvPr/>
+        </p:nvSpPr>
+        <p:spPr>
+          <a:xfrm rot="5400000">
+            <a:off x="5719619" y="1861349"/>
+            <a:ext cx="231318" cy="3668425"/>
+          </a:xfrm>
+          <a:prstGeom prst="downArrow">
+            <a:avLst/>
+          </a:prstGeom>
+          <a:solidFill>
+            <a:schemeClr val="accent6"/>
+          </a:solidFill>
+        </p:spPr>
+        <p:style>
+          <a:lnRef idx="2">
+            <a:schemeClr val="accent1">
+              <a:shade val="50000"/>
+            </a:schemeClr>
+          </a:lnRef>
+          <a:fillRef idx="1">
+            <a:schemeClr val="accent1"/>
+          </a:fillRef>
+          <a:effectRef idx="0">
+            <a:schemeClr val="accent1"/>
+          </a:effectRef>
+          <a:fontRef idx="minor">
+            <a:schemeClr val="lt1"/>
+          </a:fontRef>
+        </p:style>
+        <p:txBody>
+          <a:bodyPr rtlCol="0" anchor="ctr"/>
+          <a:lstStyle/>
+          <a:p>
+            <a:pPr algn="ctr"/>
+            <a:endParaRPr lang="fr-FR"/>
+          </a:p>
+        </p:txBody>
+      </p:sp>
+      <p:sp>
+        <p:nvSpPr>
+          <p:cNvPr id="16" name="ZoneTexte 15">
+            <a:extLst>
+              <a:ext uri="{FF2B5EF4-FFF2-40B4-BE49-F238E27FC236}">
+                <a16:creationId xmlns:a16="http://schemas.microsoft.com/office/drawing/2014/main" id="{81FEC334-79F8-45D4-A0A5-2070551C73C1}"/>
+              </a:ext>
+            </a:extLst>
+          </p:cNvPr>
+          <p:cNvSpPr txBox="1"/>
+          <p:nvPr/>
+        </p:nvSpPr>
+        <p:spPr>
+          <a:xfrm>
+            <a:off x="4251278" y="3220603"/>
+            <a:ext cx="3274598" cy="369332"/>
+          </a:xfrm>
+          <a:prstGeom prst="rect">
+            <a:avLst/>
+          </a:prstGeom>
+          <a:noFill/>
+        </p:spPr>
+        <p:txBody>
+          <a:bodyPr wrap="square" rtlCol="0">
+            <a:spAutoFit/>
+          </a:bodyPr>
+          <a:lstStyle/>
+          <a:p>
+            <a:pPr algn="ctr"/>
+            <a:r>
+              <a:rPr lang="fr-FR" dirty="0"/>
+              <a:t>Application peu utilisé </a:t>
+            </a:r>
+          </a:p>
+        </p:txBody>
+      </p:sp>
+    </p:spTree>
+    <p:extLst>
+      <p:ext uri="{BB962C8B-B14F-4D97-AF65-F5344CB8AC3E}">
+        <p14:creationId xmlns:p14="http://schemas.microsoft.com/office/powerpoint/2010/main" val="703851410"/>
+      </p:ext>
+    </p:extLst>
+  </p:cSld>
+  <p:clrMapOvr>
+    <a:masterClrMapping/>
+  </p:clrMapOvr>
+</p:sld>
+</file>
+
+<file path=ppt/slides/slide12.xml><?xml version="1.0" encoding="utf-8"?>
+<p:sld xmlns:a="http://schemas.openxmlformats.org/drawingml/2006/main" xmlns:r="http://schemas.openxmlformats.org/officeDocument/2006/relationships" xmlns:p="http://schemas.openxmlformats.org/presentationml/2006/main">
+  <p:cSld>
+    <p:spTree>
+      <p:nvGrpSpPr>
+        <p:cNvPr id="1" name=""/>
+        <p:cNvGrpSpPr/>
+        <p:nvPr/>
+      </p:nvGrpSpPr>
+      <p:grpSpPr>
+        <a:xfrm>
+          <a:off x="0" y="0"/>
+          <a:ext cx="0" cy="0"/>
+          <a:chOff x="0" y="0"/>
+          <a:chExt cx="0" cy="0"/>
+        </a:xfrm>
+      </p:grpSpPr>
+      <p:sp>
+        <p:nvSpPr>
+          <p:cNvPr id="2" name="Titre 1">
+            <a:extLst>
+              <a:ext uri="{FF2B5EF4-FFF2-40B4-BE49-F238E27FC236}">
+                <a16:creationId xmlns:a16="http://schemas.microsoft.com/office/drawing/2014/main" id="{599A7659-48E7-4062-B2B3-C08DD126E01C}"/>
+              </a:ext>
+            </a:extLst>
+          </p:cNvPr>
+          <p:cNvSpPr>
+            <a:spLocks noGrp="1"/>
+          </p:cNvSpPr>
+          <p:nvPr>
+            <p:ph type="title"/>
+          </p:nvPr>
+        </p:nvSpPr>
+        <p:spPr/>
+        <p:txBody>
+          <a:bodyPr/>
+          <a:lstStyle/>
+          <a:p>
+            <a:pPr algn="ctr"/>
+            <a:r>
+              <a:rPr lang="fr-FR" dirty="0"/>
+              <a:t>Application à haut niveau d’investissement</a:t>
+            </a:r>
+          </a:p>
+        </p:txBody>
+      </p:sp>
+      <p:sp>
+        <p:nvSpPr>
+          <p:cNvPr id="3" name="Espace réservé du contenu 2">
+            <a:extLst>
+              <a:ext uri="{FF2B5EF4-FFF2-40B4-BE49-F238E27FC236}">
+                <a16:creationId xmlns:a16="http://schemas.microsoft.com/office/drawing/2014/main" id="{634F8094-DFCD-4E4E-93AD-CAA730D73A03}"/>
+              </a:ext>
+            </a:extLst>
+          </p:cNvPr>
+          <p:cNvSpPr>
+            <a:spLocks noGrp="1"/>
+          </p:cNvSpPr>
+          <p:nvPr>
+            <p:ph idx="1"/>
+          </p:nvPr>
+        </p:nvSpPr>
+        <p:spPr/>
+        <p:txBody>
+          <a:bodyPr/>
+          <a:lstStyle/>
+          <a:p>
+            <a:endParaRPr lang="fr-FR" dirty="0"/>
+          </a:p>
+        </p:txBody>
+      </p:sp>
+      <p:sp>
+        <p:nvSpPr>
+          <p:cNvPr id="4" name="Rectangle : coins arrondis 3">
+            <a:extLst>
+              <a:ext uri="{FF2B5EF4-FFF2-40B4-BE49-F238E27FC236}">
+                <a16:creationId xmlns:a16="http://schemas.microsoft.com/office/drawing/2014/main" id="{7B15E9DE-2F57-4277-B9D7-C14A5AFFE1F9}"/>
+              </a:ext>
+            </a:extLst>
+          </p:cNvPr>
+          <p:cNvSpPr/>
+          <p:nvPr/>
+        </p:nvSpPr>
+        <p:spPr>
+          <a:xfrm>
+            <a:off x="4734636" y="2014234"/>
+            <a:ext cx="2722727" cy="685767"/>
+          </a:xfrm>
+          <a:prstGeom prst="roundRect">
+            <a:avLst/>
+          </a:prstGeom>
+        </p:spPr>
+        <p:style>
+          <a:lnRef idx="2">
+            <a:schemeClr val="accent1">
+              <a:shade val="50000"/>
+            </a:schemeClr>
+          </a:lnRef>
+          <a:fillRef idx="1">
+            <a:schemeClr val="accent1"/>
+          </a:fillRef>
+          <a:effectRef idx="0">
+            <a:schemeClr val="accent1"/>
+          </a:effectRef>
+          <a:fontRef idx="minor">
+            <a:schemeClr val="lt1"/>
+          </a:fontRef>
+        </p:style>
+        <p:txBody>
+          <a:bodyPr rtlCol="0" anchor="ctr"/>
+          <a:lstStyle/>
+          <a:p>
+            <a:pPr algn="ctr"/>
+            <a:endParaRPr lang="fr-FR" dirty="0"/>
+          </a:p>
+          <a:p>
+            <a:pPr algn="ctr"/>
+            <a:r>
+              <a:rPr lang="fr-FR" dirty="0"/>
+              <a:t>Equipe de développement conséquente </a:t>
+            </a:r>
+          </a:p>
+          <a:p>
+            <a:pPr algn="ctr"/>
+            <a:endParaRPr lang="fr-FR" dirty="0"/>
+          </a:p>
+        </p:txBody>
+      </p:sp>
+      <p:sp>
+        <p:nvSpPr>
+          <p:cNvPr id="6" name="Rectangle : coins arrondis 5">
+            <a:extLst>
+              <a:ext uri="{FF2B5EF4-FFF2-40B4-BE49-F238E27FC236}">
+                <a16:creationId xmlns:a16="http://schemas.microsoft.com/office/drawing/2014/main" id="{17C79510-CEF6-402F-8441-4704763E0016}"/>
+              </a:ext>
+            </a:extLst>
+          </p:cNvPr>
+          <p:cNvSpPr/>
+          <p:nvPr/>
+        </p:nvSpPr>
+        <p:spPr>
+          <a:xfrm>
+            <a:off x="4734633" y="3116399"/>
+            <a:ext cx="2695433" cy="582653"/>
+          </a:xfrm>
+          <a:prstGeom prst="roundRect">
+            <a:avLst/>
+          </a:prstGeom>
+        </p:spPr>
+        <p:style>
+          <a:lnRef idx="2">
+            <a:schemeClr val="accent1">
+              <a:shade val="50000"/>
+            </a:schemeClr>
+          </a:lnRef>
+          <a:fillRef idx="1">
+            <a:schemeClr val="accent1"/>
+          </a:fillRef>
+          <a:effectRef idx="0">
+            <a:schemeClr val="accent1"/>
+          </a:effectRef>
+          <a:fontRef idx="minor">
+            <a:schemeClr val="lt1"/>
+          </a:fontRef>
+        </p:style>
+        <p:txBody>
+          <a:bodyPr rtlCol="0" anchor="ctr"/>
+          <a:lstStyle/>
+          <a:p>
+            <a:pPr algn="ctr"/>
+            <a:endParaRPr lang="fr-FR" dirty="0"/>
+          </a:p>
+          <a:p>
+            <a:pPr algn="ctr"/>
+            <a:r>
+              <a:rPr lang="fr-FR" dirty="0"/>
+              <a:t>Large diffusion de l’application </a:t>
+            </a:r>
+          </a:p>
+          <a:p>
+            <a:pPr algn="ctr"/>
+            <a:endParaRPr lang="fr-FR" dirty="0"/>
+          </a:p>
+        </p:txBody>
+      </p:sp>
+      <p:sp>
+        <p:nvSpPr>
+          <p:cNvPr id="8" name="Rectangle : coins arrondis 7">
+            <a:extLst>
+              <a:ext uri="{FF2B5EF4-FFF2-40B4-BE49-F238E27FC236}">
+                <a16:creationId xmlns:a16="http://schemas.microsoft.com/office/drawing/2014/main" id="{8366DB37-0B86-4D88-B79C-922B47F291C4}"/>
+              </a:ext>
+            </a:extLst>
+          </p:cNvPr>
+          <p:cNvSpPr/>
+          <p:nvPr/>
+        </p:nvSpPr>
+        <p:spPr>
+          <a:xfrm>
+            <a:off x="4734634" y="4115450"/>
+            <a:ext cx="2695433" cy="520527"/>
+          </a:xfrm>
+          <a:prstGeom prst="roundRect">
+            <a:avLst/>
+          </a:prstGeom>
+        </p:spPr>
+        <p:style>
+          <a:lnRef idx="2">
+            <a:schemeClr val="accent1">
+              <a:shade val="50000"/>
+            </a:schemeClr>
+          </a:lnRef>
+          <a:fillRef idx="1">
+            <a:schemeClr val="accent1"/>
+          </a:fillRef>
+          <a:effectRef idx="0">
+            <a:schemeClr val="accent1"/>
+          </a:effectRef>
+          <a:fontRef idx="minor">
+            <a:schemeClr val="lt1"/>
+          </a:fontRef>
+        </p:style>
+        <p:txBody>
+          <a:bodyPr rtlCol="0" anchor="ctr"/>
+          <a:lstStyle/>
+          <a:p>
+            <a:pPr algn="ctr"/>
+            <a:r>
+              <a:rPr lang="fr-FR" dirty="0"/>
+              <a:t>Dérives</a:t>
+            </a:r>
+          </a:p>
+        </p:txBody>
+      </p:sp>
+      <p:sp>
+        <p:nvSpPr>
+          <p:cNvPr id="11" name="Rectangle : coins arrondis 10">
+            <a:extLst>
+              <a:ext uri="{FF2B5EF4-FFF2-40B4-BE49-F238E27FC236}">
+                <a16:creationId xmlns:a16="http://schemas.microsoft.com/office/drawing/2014/main" id="{5B476202-031C-47B9-ACF7-7F880D0C20FE}"/>
+              </a:ext>
+            </a:extLst>
+          </p:cNvPr>
+          <p:cNvSpPr/>
+          <p:nvPr/>
+        </p:nvSpPr>
+        <p:spPr>
+          <a:xfrm>
+            <a:off x="2550992" y="5052375"/>
+            <a:ext cx="2695433" cy="520527"/>
+          </a:xfrm>
+          <a:prstGeom prst="roundRect">
+            <a:avLst/>
+          </a:prstGeom>
+        </p:spPr>
+        <p:style>
+          <a:lnRef idx="2">
+            <a:schemeClr val="accent1">
+              <a:shade val="50000"/>
+            </a:schemeClr>
+          </a:lnRef>
+          <a:fillRef idx="1">
+            <a:schemeClr val="accent1"/>
+          </a:fillRef>
+          <a:effectRef idx="0">
+            <a:schemeClr val="accent1"/>
+          </a:effectRef>
+          <a:fontRef idx="minor">
+            <a:schemeClr val="lt1"/>
+          </a:fontRef>
+        </p:style>
+        <p:txBody>
+          <a:bodyPr rtlCol="0" anchor="ctr"/>
+          <a:lstStyle/>
+          <a:p>
+            <a:pPr algn="ctr"/>
+            <a:r>
+              <a:rPr lang="fr-FR" dirty="0"/>
+              <a:t>Santé</a:t>
+            </a:r>
+          </a:p>
+        </p:txBody>
+      </p:sp>
+      <p:sp>
+        <p:nvSpPr>
+          <p:cNvPr id="12" name="Rectangle : coins arrondis 11">
+            <a:extLst>
+              <a:ext uri="{FF2B5EF4-FFF2-40B4-BE49-F238E27FC236}">
+                <a16:creationId xmlns:a16="http://schemas.microsoft.com/office/drawing/2014/main" id="{A513C068-8266-4694-9C2A-AC6F06A899BF}"/>
+              </a:ext>
+            </a:extLst>
+          </p:cNvPr>
+          <p:cNvSpPr/>
+          <p:nvPr/>
+        </p:nvSpPr>
+        <p:spPr>
+          <a:xfrm>
+            <a:off x="6945575" y="5052374"/>
+            <a:ext cx="2695433" cy="520527"/>
+          </a:xfrm>
+          <a:prstGeom prst="roundRect">
+            <a:avLst/>
+          </a:prstGeom>
+        </p:spPr>
+        <p:style>
+          <a:lnRef idx="2">
+            <a:schemeClr val="accent1">
+              <a:shade val="50000"/>
+            </a:schemeClr>
+          </a:lnRef>
+          <a:fillRef idx="1">
+            <a:schemeClr val="accent1"/>
+          </a:fillRef>
+          <a:effectRef idx="0">
+            <a:schemeClr val="accent1"/>
+          </a:effectRef>
+          <a:fontRef idx="minor">
+            <a:schemeClr val="lt1"/>
+          </a:fontRef>
+        </p:style>
+        <p:txBody>
+          <a:bodyPr rtlCol="0" anchor="ctr"/>
+          <a:lstStyle/>
+          <a:p>
+            <a:pPr algn="ctr"/>
+            <a:r>
+              <a:rPr lang="fr-FR" dirty="0"/>
+              <a:t>Ventes de données</a:t>
+            </a:r>
+          </a:p>
+        </p:txBody>
+      </p:sp>
+      <p:sp>
+        <p:nvSpPr>
+          <p:cNvPr id="13" name="Flèche : bas 12">
+            <a:extLst>
+              <a:ext uri="{FF2B5EF4-FFF2-40B4-BE49-F238E27FC236}">
+                <a16:creationId xmlns:a16="http://schemas.microsoft.com/office/drawing/2014/main" id="{7538C6FD-5369-4484-8A32-9F57F1987FA3}"/>
+              </a:ext>
+            </a:extLst>
+          </p:cNvPr>
+          <p:cNvSpPr/>
+          <p:nvPr/>
+        </p:nvSpPr>
+        <p:spPr>
+          <a:xfrm>
+            <a:off x="6042543" y="2710263"/>
+            <a:ext cx="106911" cy="406136"/>
+          </a:xfrm>
+          <a:prstGeom prst="downArrow">
+            <a:avLst/>
+          </a:prstGeom>
+          <a:solidFill>
+            <a:schemeClr val="accent6"/>
+          </a:solidFill>
+        </p:spPr>
+        <p:style>
+          <a:lnRef idx="2">
+            <a:schemeClr val="accent1">
+              <a:shade val="50000"/>
+            </a:schemeClr>
+          </a:lnRef>
+          <a:fillRef idx="1">
+            <a:schemeClr val="accent1"/>
+          </a:fillRef>
+          <a:effectRef idx="0">
+            <a:schemeClr val="accent1"/>
+          </a:effectRef>
+          <a:fontRef idx="minor">
+            <a:schemeClr val="lt1"/>
+          </a:fontRef>
+        </p:style>
+        <p:txBody>
+          <a:bodyPr rtlCol="0" anchor="ctr"/>
+          <a:lstStyle/>
+          <a:p>
+            <a:pPr algn="ctr"/>
+            <a:endParaRPr lang="fr-FR"/>
+          </a:p>
+        </p:txBody>
+      </p:sp>
+      <p:sp>
+        <p:nvSpPr>
+          <p:cNvPr id="14" name="Flèche : bas 13">
+            <a:extLst>
+              <a:ext uri="{FF2B5EF4-FFF2-40B4-BE49-F238E27FC236}">
+                <a16:creationId xmlns:a16="http://schemas.microsoft.com/office/drawing/2014/main" id="{3477CFA6-D5C1-4DD1-97B2-C0F8EEA3F0DD}"/>
+              </a:ext>
+            </a:extLst>
+          </p:cNvPr>
+          <p:cNvSpPr/>
+          <p:nvPr/>
+        </p:nvSpPr>
+        <p:spPr>
+          <a:xfrm>
+            <a:off x="6042543" y="3709314"/>
+            <a:ext cx="106911" cy="406136"/>
+          </a:xfrm>
+          <a:prstGeom prst="downArrow">
+            <a:avLst/>
+          </a:prstGeom>
+          <a:solidFill>
+            <a:schemeClr val="accent6"/>
+          </a:solidFill>
+        </p:spPr>
+        <p:style>
+          <a:lnRef idx="2">
+            <a:schemeClr val="accent1">
+              <a:shade val="50000"/>
+            </a:schemeClr>
+          </a:lnRef>
+          <a:fillRef idx="1">
+            <a:schemeClr val="accent1"/>
+          </a:fillRef>
+          <a:effectRef idx="0">
+            <a:schemeClr val="accent1"/>
+          </a:effectRef>
+          <a:fontRef idx="minor">
+            <a:schemeClr val="lt1"/>
+          </a:fontRef>
+        </p:style>
+        <p:txBody>
+          <a:bodyPr rtlCol="0" anchor="ctr"/>
+          <a:lstStyle/>
+          <a:p>
+            <a:pPr algn="ctr"/>
+            <a:endParaRPr lang="fr-FR"/>
+          </a:p>
+        </p:txBody>
+      </p:sp>
+      <p:sp>
+        <p:nvSpPr>
+          <p:cNvPr id="16" name="Flèche : bas 15">
+            <a:extLst>
+              <a:ext uri="{FF2B5EF4-FFF2-40B4-BE49-F238E27FC236}">
+                <a16:creationId xmlns:a16="http://schemas.microsoft.com/office/drawing/2014/main" id="{50110750-5FA9-4424-A3F0-193DF8E7A6F4}"/>
+              </a:ext>
+            </a:extLst>
+          </p:cNvPr>
+          <p:cNvSpPr/>
+          <p:nvPr/>
+        </p:nvSpPr>
+        <p:spPr>
+          <a:xfrm>
+            <a:off x="4930251" y="4646238"/>
+            <a:ext cx="106911" cy="406136"/>
+          </a:xfrm>
+          <a:prstGeom prst="downArrow">
+            <a:avLst/>
+          </a:prstGeom>
+          <a:solidFill>
+            <a:schemeClr val="accent6"/>
+          </a:solidFill>
+        </p:spPr>
+        <p:style>
+          <a:lnRef idx="2">
+            <a:schemeClr val="accent1">
+              <a:shade val="50000"/>
+            </a:schemeClr>
+          </a:lnRef>
+          <a:fillRef idx="1">
+            <a:schemeClr val="accent1"/>
+          </a:fillRef>
+          <a:effectRef idx="0">
+            <a:schemeClr val="accent1"/>
+          </a:effectRef>
+          <a:fontRef idx="minor">
+            <a:schemeClr val="lt1"/>
+          </a:fontRef>
+        </p:style>
+        <p:txBody>
+          <a:bodyPr rtlCol="0" anchor="ctr"/>
+          <a:lstStyle/>
+          <a:p>
+            <a:pPr algn="ctr"/>
+            <a:endParaRPr lang="fr-FR"/>
+          </a:p>
+        </p:txBody>
+      </p:sp>
+      <p:sp>
+        <p:nvSpPr>
+          <p:cNvPr id="17" name="Flèche : bas 16">
+            <a:extLst>
+              <a:ext uri="{FF2B5EF4-FFF2-40B4-BE49-F238E27FC236}">
+                <a16:creationId xmlns:a16="http://schemas.microsoft.com/office/drawing/2014/main" id="{88CA8085-C7C9-4E30-B740-D9AF16D206A5}"/>
+              </a:ext>
+            </a:extLst>
+          </p:cNvPr>
+          <p:cNvSpPr/>
+          <p:nvPr/>
+        </p:nvSpPr>
+        <p:spPr>
+          <a:xfrm>
+            <a:off x="7154838" y="4646238"/>
+            <a:ext cx="106911" cy="406136"/>
+          </a:xfrm>
+          <a:prstGeom prst="downArrow">
+            <a:avLst/>
+          </a:prstGeom>
+          <a:solidFill>
+            <a:schemeClr val="accent6"/>
+          </a:solidFill>
+        </p:spPr>
+        <p:style>
+          <a:lnRef idx="2">
+            <a:schemeClr val="accent1">
+              <a:shade val="50000"/>
+            </a:schemeClr>
+          </a:lnRef>
+          <a:fillRef idx="1">
+            <a:schemeClr val="accent1"/>
+          </a:fillRef>
+          <a:effectRef idx="0">
+            <a:schemeClr val="accent1"/>
+          </a:effectRef>
+          <a:fontRef idx="minor">
+            <a:schemeClr val="lt1"/>
+          </a:fontRef>
+        </p:style>
+        <p:txBody>
+          <a:bodyPr rtlCol="0" anchor="ctr"/>
+          <a:lstStyle/>
+          <a:p>
+            <a:pPr algn="ctr"/>
+            <a:endParaRPr lang="fr-FR"/>
+          </a:p>
+        </p:txBody>
+      </p:sp>
+    </p:spTree>
+    <p:extLst>
+      <p:ext uri="{BB962C8B-B14F-4D97-AF65-F5344CB8AC3E}">
+        <p14:creationId xmlns:p14="http://schemas.microsoft.com/office/powerpoint/2010/main" val="2566990598"/>
       </p:ext>
     </p:extLst>
   </p:cSld>
@@ -8923,4 +10580,299 @@
     </a:ext>
   </a:extLst>
 </a:theme>
+</file>
+
+<file path=ppt/theme/theme2.xml><?xml version="1.0" encoding="utf-8"?>
+<a:theme xmlns:a="http://schemas.openxmlformats.org/drawingml/2006/main" name="Thème Office">
+  <a:themeElements>
+    <a:clrScheme name="Office">
+      <a:dk1>
+        <a:sysClr val="windowText" lastClr="000000"/>
+      </a:dk1>
+      <a:lt1>
+        <a:sysClr val="window" lastClr="FFFFFF"/>
+      </a:lt1>
+      <a:dk2>
+        <a:srgbClr val="44546A"/>
+      </a:dk2>
+      <a:lt2>
+        <a:srgbClr val="E7E6E6"/>
+      </a:lt2>
+      <a:accent1>
+        <a:srgbClr val="4472C4"/>
+      </a:accent1>
+      <a:accent2>
+        <a:srgbClr val="ED7D31"/>
+      </a:accent2>
+      <a:accent3>
+        <a:srgbClr val="A5A5A5"/>
+      </a:accent3>
+      <a:accent4>
+        <a:srgbClr val="FFC000"/>
+      </a:accent4>
+      <a:accent5>
+        <a:srgbClr val="5B9BD5"/>
+      </a:accent5>
+      <a:accent6>
+        <a:srgbClr val="70AD47"/>
+      </a:accent6>
+      <a:hlink>
+        <a:srgbClr val="0563C1"/>
+      </a:hlink>
+      <a:folHlink>
+        <a:srgbClr val="954F72"/>
+      </a:folHlink>
+    </a:clrScheme>
+    <a:fontScheme name="Office">
+      <a:majorFont>
+        <a:latin typeface="Calibri Light" panose="020F0302020204030204"/>
+        <a:ea typeface=""/>
+        <a:cs typeface=""/>
+        <a:font script="Jpan" typeface="游ゴシック Light"/>
+        <a:font script="Hang" typeface="맑은 고딕"/>
+        <a:font script="Hans" typeface="等线 Light"/>
+        <a:font script="Hant" typeface="新細明體"/>
+        <a:font script="Arab" typeface="Times New Roman"/>
+        <a:font script="Hebr" typeface="Times New Roman"/>
+        <a:font script="Thai" typeface="Angsana New"/>
+        <a:font script="Ethi" typeface="Nyala"/>
+        <a:font script="Beng" typeface="Vrinda"/>
+        <a:font script="Gujr" typeface="Shruti"/>
+        <a:font script="Khmr" typeface="MoolBoran"/>
+        <a:font script="Knda" typeface="Tunga"/>
+        <a:font script="Guru" typeface="Raavi"/>
+        <a:font script="Cans" typeface="Euphemia"/>
+        <a:font script="Cher" typeface="Plantagenet Cherokee"/>
+        <a:font script="Yiii" typeface="Microsoft Yi Baiti"/>
+        <a:font script="Tibt" typeface="Microsoft Himalaya"/>
+        <a:font script="Thaa" typeface="MV Boli"/>
+        <a:font script="Deva" typeface="Mangal"/>
+        <a:font script="Telu" typeface="Gautami"/>
+        <a:font script="Taml" typeface="Latha"/>
+        <a:font script="Syrc" typeface="Estrangelo Edessa"/>
+        <a:font script="Orya" typeface="Kalinga"/>
+        <a:font script="Mlym" typeface="Kartika"/>
+        <a:font script="Laoo" typeface="DokChampa"/>
+        <a:font script="Sinh" typeface="Iskoola Pota"/>
+        <a:font script="Mong" typeface="Mongolian Baiti"/>
+        <a:font script="Viet" typeface="Times New Roman"/>
+        <a:font script="Uigh" typeface="Microsoft Uighur"/>
+        <a:font script="Geor" typeface="Sylfaen"/>
+        <a:font script="Armn" typeface="Arial"/>
+        <a:font script="Bugi" typeface="Leelawadee UI"/>
+        <a:font script="Bopo" typeface="Microsoft JhengHei"/>
+        <a:font script="Java" typeface="Javanese Text"/>
+        <a:font script="Lisu" typeface="Segoe UI"/>
+        <a:font script="Mymr" typeface="Myanmar Text"/>
+        <a:font script="Nkoo" typeface="Ebrima"/>
+        <a:font script="Olck" typeface="Nirmala UI"/>
+        <a:font script="Osma" typeface="Ebrima"/>
+        <a:font script="Phag" typeface="Phagspa"/>
+        <a:font script="Syrn" typeface="Estrangelo Edessa"/>
+        <a:font script="Syrj" typeface="Estrangelo Edessa"/>
+        <a:font script="Syre" typeface="Estrangelo Edessa"/>
+        <a:font script="Sora" typeface="Nirmala UI"/>
+        <a:font script="Tale" typeface="Microsoft Tai Le"/>
+        <a:font script="Talu" typeface="Microsoft New Tai Lue"/>
+        <a:font script="Tfng" typeface="Ebrima"/>
+      </a:majorFont>
+      <a:minorFont>
+        <a:latin typeface="Calibri" panose="020F0502020204030204"/>
+        <a:ea typeface=""/>
+        <a:cs typeface=""/>
+        <a:font script="Jpan" typeface="游ゴシック"/>
+        <a:font script="Hang" typeface="맑은 고딕"/>
+        <a:font script="Hans" typeface="等线"/>
+        <a:font script="Hant" typeface="新細明體"/>
+        <a:font script="Arab" typeface="Arial"/>
+        <a:font script="Hebr" typeface="Arial"/>
+        <a:font script="Thai" typeface="Cordia New"/>
+        <a:font script="Ethi" typeface="Nyala"/>
+        <a:font script="Beng" typeface="Vrinda"/>
+        <a:font script="Gujr" typeface="Shruti"/>
+        <a:font script="Khmr" typeface="DaunPenh"/>
+        <a:font script="Knda" typeface="Tunga"/>
+        <a:font script="Guru" typeface="Raavi"/>
+        <a:font script="Cans" typeface="Euphemia"/>
+        <a:font script="Cher" typeface="Plantagenet Cherokee"/>
+        <a:font script="Yiii" typeface="Microsoft Yi Baiti"/>
+        <a:font script="Tibt" typeface="Microsoft Himalaya"/>
+        <a:font script="Thaa" typeface="MV Boli"/>
+        <a:font script="Deva" typeface="Mangal"/>
+        <a:font script="Telu" typeface="Gautami"/>
+        <a:font script="Taml" typeface="Latha"/>
+        <a:font script="Syrc" typeface="Estrangelo Edessa"/>
+        <a:font script="Orya" typeface="Kalinga"/>
+        <a:font script="Mlym" typeface="Kartika"/>
+        <a:font script="Laoo" typeface="DokChampa"/>
+        <a:font script="Sinh" typeface="Iskoola Pota"/>
+        <a:font script="Mong" typeface="Mongolian Baiti"/>
+        <a:font script="Viet" typeface="Arial"/>
+        <a:font script="Uigh" typeface="Microsoft Uighur"/>
+        <a:font script="Geor" typeface="Sylfaen"/>
+        <a:font script="Armn" typeface="Arial"/>
+        <a:font script="Bugi" typeface="Leelawadee UI"/>
+        <a:font script="Bopo" typeface="Microsoft JhengHei"/>
+        <a:font script="Java" typeface="Javanese Text"/>
+        <a:font script="Lisu" typeface="Segoe UI"/>
+        <a:font script="Mymr" typeface="Myanmar Text"/>
+        <a:font script="Nkoo" typeface="Ebrima"/>
+        <a:font script="Olck" typeface="Nirmala UI"/>
+        <a:font script="Osma" typeface="Ebrima"/>
+        <a:font script="Phag" typeface="Phagspa"/>
+        <a:font script="Syrn" typeface="Estrangelo Edessa"/>
+        <a:font script="Syrj" typeface="Estrangelo Edessa"/>
+        <a:font script="Syre" typeface="Estrangelo Edessa"/>
+        <a:font script="Sora" typeface="Nirmala UI"/>
+        <a:font script="Tale" typeface="Microsoft Tai Le"/>
+        <a:font script="Talu" typeface="Microsoft New Tai Lue"/>
+        <a:font script="Tfng" typeface="Ebrima"/>
+      </a:minorFont>
+    </a:fontScheme>
+    <a:fmtScheme name="Office">
+      <a:fillStyleLst>
+        <a:solidFill>
+          <a:schemeClr val="phClr"/>
+        </a:solidFill>
+        <a:gradFill rotWithShape="1">
+          <a:gsLst>
+            <a:gs pos="0">
+              <a:schemeClr val="phClr">
+                <a:lumMod val="110000"/>
+                <a:satMod val="105000"/>
+                <a:tint val="67000"/>
+              </a:schemeClr>
+            </a:gs>
+            <a:gs pos="50000">
+              <a:schemeClr val="phClr">
+                <a:lumMod val="105000"/>
+                <a:satMod val="103000"/>
+                <a:tint val="73000"/>
+              </a:schemeClr>
+            </a:gs>
+            <a:gs pos="100000">
+              <a:schemeClr val="phClr">
+                <a:lumMod val="105000"/>
+                <a:satMod val="109000"/>
+                <a:tint val="81000"/>
+              </a:schemeClr>
+            </a:gs>
+          </a:gsLst>
+          <a:lin ang="5400000" scaled="0"/>
+        </a:gradFill>
+        <a:gradFill rotWithShape="1">
+          <a:gsLst>
+            <a:gs pos="0">
+              <a:schemeClr val="phClr">
+                <a:satMod val="103000"/>
+                <a:lumMod val="102000"/>
+                <a:tint val="94000"/>
+              </a:schemeClr>
+            </a:gs>
+            <a:gs pos="50000">
+              <a:schemeClr val="phClr">
+                <a:satMod val="110000"/>
+                <a:lumMod val="100000"/>
+                <a:shade val="100000"/>
+              </a:schemeClr>
+            </a:gs>
+            <a:gs pos="100000">
+              <a:schemeClr val="phClr">
+                <a:lumMod val="99000"/>
+                <a:satMod val="120000"/>
+                <a:shade val="78000"/>
+              </a:schemeClr>
+            </a:gs>
+          </a:gsLst>
+          <a:lin ang="5400000" scaled="0"/>
+        </a:gradFill>
+      </a:fillStyleLst>
+      <a:lnStyleLst>
+        <a:ln w="6350" cap="flat" cmpd="sng" algn="ctr">
+          <a:solidFill>
+            <a:schemeClr val="phClr"/>
+          </a:solidFill>
+          <a:prstDash val="solid"/>
+          <a:miter lim="800000"/>
+        </a:ln>
+        <a:ln w="12700" cap="flat" cmpd="sng" algn="ctr">
+          <a:solidFill>
+            <a:schemeClr val="phClr"/>
+          </a:solidFill>
+          <a:prstDash val="solid"/>
+          <a:miter lim="800000"/>
+        </a:ln>
+        <a:ln w="19050" cap="flat" cmpd="sng" algn="ctr">
+          <a:solidFill>
+            <a:schemeClr val="phClr"/>
+          </a:solidFill>
+          <a:prstDash val="solid"/>
+          <a:miter lim="800000"/>
+        </a:ln>
+      </a:lnStyleLst>
+      <a:effectStyleLst>
+        <a:effectStyle>
+          <a:effectLst/>
+        </a:effectStyle>
+        <a:effectStyle>
+          <a:effectLst/>
+        </a:effectStyle>
+        <a:effectStyle>
+          <a:effectLst>
+            <a:outerShdw blurRad="57150" dist="19050" dir="5400000" algn="ctr" rotWithShape="0">
+              <a:srgbClr val="000000">
+                <a:alpha val="63000"/>
+              </a:srgbClr>
+            </a:outerShdw>
+          </a:effectLst>
+        </a:effectStyle>
+      </a:effectStyleLst>
+      <a:bgFillStyleLst>
+        <a:solidFill>
+          <a:schemeClr val="phClr"/>
+        </a:solidFill>
+        <a:solidFill>
+          <a:schemeClr val="phClr">
+            <a:tint val="95000"/>
+            <a:satMod val="170000"/>
+          </a:schemeClr>
+        </a:solidFill>
+        <a:gradFill rotWithShape="1">
+          <a:gsLst>
+            <a:gs pos="0">
+              <a:schemeClr val="phClr">
+                <a:tint val="93000"/>
+                <a:satMod val="150000"/>
+                <a:shade val="98000"/>
+                <a:lumMod val="102000"/>
+              </a:schemeClr>
+            </a:gs>
+            <a:gs pos="50000">
+              <a:schemeClr val="phClr">
+                <a:tint val="98000"/>
+                <a:satMod val="130000"/>
+                <a:shade val="90000"/>
+                <a:lumMod val="103000"/>
+              </a:schemeClr>
+            </a:gs>
+            <a:gs pos="100000">
+              <a:schemeClr val="phClr">
+                <a:shade val="63000"/>
+                <a:satMod val="120000"/>
+              </a:schemeClr>
+            </a:gs>
+          </a:gsLst>
+          <a:lin ang="5400000" scaled="0"/>
+        </a:gradFill>
+      </a:bgFillStyleLst>
+    </a:fmtScheme>
+  </a:themeElements>
+  <a:objectDefaults/>
+  <a:extraClrSchemeLst/>
+  <a:extLst>
+    <a:ext uri="{05A4C25C-085E-4340-85A3-A5531E510DB2}">
+      <thm15:themeFamily xmlns:thm15="http://schemas.microsoft.com/office/thememl/2012/main" name="Office Theme" id="{62F939B6-93AF-4DB8-9C6B-D6C7DFDC589F}" vid="{4A3C46E8-61CC-4603-A589-7422A47A8E4A}"/>
+    </a:ext>
+  </a:extLst>
+</a:theme>
 </file>
</xml_diff>